<commit_message>
added presentation video and altered the presentation
</commit_message>
<xml_diff>
--- a/data-exploration challenge.pptx
+++ b/data-exploration challenge.pptx
@@ -5,20 +5,19 @@
     <p:sldMasterId id="2147483648" r:id="rId1"/>
   </p:sldMasterIdLst>
   <p:sldIdLst>
-    <p:sldId id="256" r:id="rId2"/>
-    <p:sldId id="257" r:id="rId3"/>
-    <p:sldId id="258" r:id="rId4"/>
-    <p:sldId id="259" r:id="rId5"/>
-    <p:sldId id="260" r:id="rId6"/>
-    <p:sldId id="261" r:id="rId7"/>
-    <p:sldId id="262" r:id="rId8"/>
-    <p:sldId id="263" r:id="rId9"/>
-    <p:sldId id="266" r:id="rId10"/>
-    <p:sldId id="265" r:id="rId11"/>
-    <p:sldId id="267" r:id="rId12"/>
-    <p:sldId id="268" r:id="rId13"/>
-    <p:sldId id="269" r:id="rId14"/>
-    <p:sldId id="270" r:id="rId15"/>
+    <p:sldId id="257" r:id="rId2"/>
+    <p:sldId id="258" r:id="rId3"/>
+    <p:sldId id="259" r:id="rId4"/>
+    <p:sldId id="260" r:id="rId5"/>
+    <p:sldId id="261" r:id="rId6"/>
+    <p:sldId id="262" r:id="rId7"/>
+    <p:sldId id="263" r:id="rId8"/>
+    <p:sldId id="266" r:id="rId9"/>
+    <p:sldId id="265" r:id="rId10"/>
+    <p:sldId id="267" r:id="rId11"/>
+    <p:sldId id="268" r:id="rId12"/>
+    <p:sldId id="269" r:id="rId13"/>
+    <p:sldId id="270" r:id="rId14"/>
   </p:sldIdLst>
   <p:sldSz cx="12192000" cy="6858000"/>
   <p:notesSz cx="6858000" cy="9144000"/>
@@ -220,7 +219,7 @@
           <a:effectLst/>
           <a:extLst>
             <a:ext uri="{91240B29-F687-4f45-9708-019B960494DF}">
-              <a14:hiddenLine xmlns="" xmlns:a14="http://schemas.microsoft.com/office/drawing/2010/main" w="9525">
+              <a14:hiddenLine xmlns:a14="http://schemas.microsoft.com/office/drawing/2010/main" xmlns="" w="9525">
                 <a:solidFill>
                   <a:srgbClr val="000000"/>
                 </a:solidFill>
@@ -413,7 +412,7 @@
             <a:fld id="{08B9EBBA-996F-894A-B54A-D6246ED52CEA}" type="datetimeFigureOut">
               <a:rPr lang="en-US" dirty="0"/>
               <a:pPr/>
-              <a:t>5/6/2020</a:t>
+              <a:t>5/12/2020</a:t>
             </a:fld>
             <a:endParaRPr lang="en-US" dirty="0"/>
           </a:p>
@@ -728,7 +727,7 @@
             <a:fld id="{18C79C5D-2A6F-F04D-97DA-BEF2467B64E4}" type="datetimeFigureOut">
               <a:rPr lang="en-US" dirty="0"/>
               <a:pPr/>
-              <a:t>5/6/2020</a:t>
+              <a:t>5/12/2020</a:t>
             </a:fld>
             <a:endParaRPr lang="en-US" dirty="0"/>
           </a:p>
@@ -1213,7 +1212,7 @@
             <a:fld id="{8DFA1846-DA80-1C48-A609-854EA85C59AD}" type="datetimeFigureOut">
               <a:rPr lang="en-US" dirty="0"/>
               <a:pPr/>
-              <a:t>5/6/2020</a:t>
+              <a:t>5/12/2020</a:t>
             </a:fld>
             <a:endParaRPr lang="en-US" dirty="0"/>
           </a:p>
@@ -1579,7 +1578,7 @@
             <a:fld id="{FBF54567-0DE4-3F47-BF90-CB84690072F9}" type="datetimeFigureOut">
               <a:rPr lang="en-US" dirty="0"/>
               <a:pPr/>
-              <a:t>5/6/2020</a:t>
+              <a:t>5/12/2020</a:t>
             </a:fld>
             <a:endParaRPr lang="en-US" dirty="0"/>
           </a:p>
@@ -1730,7 +1729,7 @@
           <a:ln/>
           <a:extLst>
             <a:ext uri="{91240B29-F687-4f45-9708-019B960494DF}">
-              <a14:hiddenLine xmlns="" xmlns:a14="http://schemas.microsoft.com/office/drawing/2010/main" w="9525">
+              <a14:hiddenLine xmlns:a14="http://schemas.microsoft.com/office/drawing/2010/main" xmlns="" w="9525">
                 <a:solidFill>
                   <a:srgbClr val="000000"/>
                 </a:solidFill>
@@ -1849,7 +1848,7 @@
             <a:fld id="{C6C52C72-DE31-F449-A4ED-4C594FD91407}" type="datetimeFigureOut">
               <a:rPr lang="en-US" dirty="0"/>
               <a:pPr/>
-              <a:t>5/6/2020</a:t>
+              <a:t>5/12/2020</a:t>
             </a:fld>
             <a:endParaRPr lang="en-US" dirty="0"/>
           </a:p>
@@ -2002,7 +2001,7 @@
           <a:ln/>
           <a:extLst>
             <a:ext uri="{91240B29-F687-4f45-9708-019B960494DF}">
-              <a14:hiddenLine xmlns="" xmlns:a14="http://schemas.microsoft.com/office/drawing/2010/main" w="9525">
+              <a14:hiddenLine xmlns:a14="http://schemas.microsoft.com/office/drawing/2010/main" xmlns="" w="9525">
                 <a:solidFill>
                   <a:srgbClr val="000000"/>
                 </a:solidFill>
@@ -2131,7 +2130,7 @@
             <a:fld id="{ED62726E-379B-B349-9EED-81ED093FA806}" type="datetimeFigureOut">
               <a:rPr lang="en-US" dirty="0"/>
               <a:pPr/>
-              <a:t>5/6/2020</a:t>
+              <a:t>5/12/2020</a:t>
             </a:fld>
             <a:endParaRPr lang="en-US" dirty="0"/>
           </a:p>
@@ -2282,7 +2281,7 @@
           <a:ln/>
           <a:extLst>
             <a:ext uri="{91240B29-F687-4f45-9708-019B960494DF}">
-              <a14:hiddenLine xmlns="" xmlns:a14="http://schemas.microsoft.com/office/drawing/2010/main" w="9525">
+              <a14:hiddenLine xmlns:a14="http://schemas.microsoft.com/office/drawing/2010/main" xmlns="" w="9525">
                 <a:solidFill>
                   <a:srgbClr val="000000"/>
                 </a:solidFill>
@@ -2411,7 +2410,7 @@
             <a:fld id="{9B3A1323-8D79-1946-B0D7-40001CF92E9D}" type="datetimeFigureOut">
               <a:rPr lang="en-US" dirty="0"/>
               <a:pPr/>
-              <a:t>5/6/2020</a:t>
+              <a:t>5/12/2020</a:t>
             </a:fld>
             <a:endParaRPr lang="en-US" dirty="0"/>
           </a:p>
@@ -2751,7 +2750,7 @@
             <a:fld id="{8DFA1846-DA80-1C48-A609-854EA85C59AD}" type="datetimeFigureOut">
               <a:rPr lang="en-US" dirty="0"/>
               <a:pPr/>
-              <a:t>5/6/2020</a:t>
+              <a:t>5/12/2020</a:t>
             </a:fld>
             <a:endParaRPr lang="en-US" dirty="0"/>
           </a:p>
@@ -2902,7 +2901,7 @@
           <a:ln/>
           <a:extLst>
             <a:ext uri="{91240B29-F687-4f45-9708-019B960494DF}">
-              <a14:hiddenLine xmlns="" xmlns:a14="http://schemas.microsoft.com/office/drawing/2010/main" w="9525">
+              <a14:hiddenLine xmlns:a14="http://schemas.microsoft.com/office/drawing/2010/main" xmlns="" w="9525">
                 <a:solidFill>
                   <a:srgbClr val="000000"/>
                 </a:solidFill>
@@ -3087,7 +3086,7 @@
             <a:fld id="{57302355-E14B-8545-A8F8-0FE83CC9D524}" type="datetimeFigureOut">
               <a:rPr lang="en-US" dirty="0"/>
               <a:pPr/>
-              <a:t>5/6/2020</a:t>
+              <a:t>5/12/2020</a:t>
             </a:fld>
             <a:endParaRPr lang="en-US" dirty="0"/>
           </a:p>
@@ -3238,7 +3237,7 @@
           <a:ln/>
           <a:extLst>
             <a:ext uri="{91240B29-F687-4f45-9708-019B960494DF}">
-              <a14:hiddenLine xmlns="" xmlns:a14="http://schemas.microsoft.com/office/drawing/2010/main" w="9525">
+              <a14:hiddenLine xmlns:a14="http://schemas.microsoft.com/office/drawing/2010/main" xmlns="" w="9525">
                 <a:solidFill>
                   <a:srgbClr val="000000"/>
                 </a:solidFill>
@@ -3561,7 +3560,7 @@
             <a:fld id="{02640F58-564D-2B4F-AE67-E407BA4FCF45}" type="datetimeFigureOut">
               <a:rPr lang="en-US" dirty="0"/>
               <a:pPr/>
-              <a:t>5/6/2020</a:t>
+              <a:t>5/12/2020</a:t>
             </a:fld>
             <a:endParaRPr lang="en-US" dirty="0"/>
           </a:p>
@@ -3712,7 +3711,7 @@
           <a:ln/>
           <a:extLst>
             <a:ext uri="{91240B29-F687-4f45-9708-019B960494DF}">
-              <a14:hiddenLine xmlns="" xmlns:a14="http://schemas.microsoft.com/office/drawing/2010/main" w="9525">
+              <a14:hiddenLine xmlns:a14="http://schemas.microsoft.com/office/drawing/2010/main" xmlns="" w="9525">
                 <a:solidFill>
                   <a:srgbClr val="000000"/>
                 </a:solidFill>
@@ -3779,7 +3778,7 @@
             <a:fld id="{F13A34C8-038E-2045-AF43-DF7DBB8E0E9E}" type="datetimeFigureOut">
               <a:rPr lang="en-US" dirty="0"/>
               <a:pPr/>
-              <a:t>5/6/2020</a:t>
+              <a:t>5/12/2020</a:t>
             </a:fld>
             <a:endParaRPr lang="en-US" dirty="0"/>
           </a:p>
@@ -3871,7 +3870,7 @@
             <a:fld id="{8818C68F-D26B-8F47-958C-23B49CF8A634}" type="datetimeFigureOut">
               <a:rPr lang="en-US" dirty="0"/>
               <a:pPr/>
-              <a:t>5/6/2020</a:t>
+              <a:t>5/12/2020</a:t>
             </a:fld>
             <a:endParaRPr lang="en-US" dirty="0"/>
           </a:p>
@@ -4135,7 +4134,7 @@
           <a:ln/>
           <a:extLst>
             <a:ext uri="{91240B29-F687-4f45-9708-019B960494DF}">
-              <a14:hiddenLine xmlns="" xmlns:a14="http://schemas.microsoft.com/office/drawing/2010/main" w="9525">
+              <a14:hiddenLine xmlns:a14="http://schemas.microsoft.com/office/drawing/2010/main" xmlns="" w="9525">
                 <a:solidFill>
                   <a:srgbClr val="000000"/>
                 </a:solidFill>
@@ -4335,7 +4334,7 @@
             <a:fld id="{D0DF5E60-9974-AC48-9591-99C2BB44B7CF}" type="datetimeFigureOut">
               <a:rPr lang="en-US" dirty="0"/>
               <a:pPr/>
-              <a:t>5/6/2020</a:t>
+              <a:t>5/12/2020</a:t>
             </a:fld>
             <a:endParaRPr lang="en-US" dirty="0"/>
           </a:p>
@@ -4645,7 +4644,7 @@
             <a:fld id="{18C79C5D-2A6F-F04D-97DA-BEF2467B64E4}" type="datetimeFigureOut">
               <a:rPr lang="en-US" dirty="0"/>
               <a:pPr/>
-              <a:t>5/6/2020</a:t>
+              <a:t>5/12/2020</a:t>
             </a:fld>
             <a:endParaRPr lang="en-US" dirty="0"/>
           </a:p>
@@ -4912,7 +4911,7 @@
             <a:fld id="{09B482E8-6E0E-1B4F-B1FD-C69DB9E858D9}" type="datetimeFigureOut">
               <a:rPr lang="en-US" dirty="0"/>
               <a:pPr/>
-              <a:t>5/6/2020</a:t>
+              <a:t>5/12/2020</a:t>
             </a:fld>
             <a:endParaRPr lang="en-US" dirty="0"/>
           </a:p>
@@ -5344,6 +5343,14 @@
 <file path=ppt/slides/slide1.xml><?xml version="1.0" encoding="utf-8"?>
 <p:sld xmlns:a="http://schemas.openxmlformats.org/drawingml/2006/main" xmlns:r="http://schemas.openxmlformats.org/officeDocument/2006/relationships" xmlns:p="http://schemas.openxmlformats.org/presentationml/2006/main">
   <p:cSld>
+    <p:bg>
+      <p:bgPr>
+        <a:solidFill>
+          <a:schemeClr val="bg2"/>
+        </a:solidFill>
+        <a:effectLst/>
+      </p:bgPr>
+    </p:bg>
     <p:spTree>
       <p:nvGrpSpPr>
         <p:cNvPr id="1" name=""/>
@@ -5358,115 +5365,206 @@
           <a:chExt cx="0" cy="0"/>
         </a:xfrm>
       </p:grpSpPr>
+      <p:sp useBgFill="1">
+        <p:nvSpPr>
+          <p:cNvPr id="14" name="Rectangle 9">
+            <a:extLst>
+              <a:ext uri="{FF2B5EF4-FFF2-40B4-BE49-F238E27FC236}">
+                <a16:creationId xmlns:a16="http://schemas.microsoft.com/office/drawing/2014/main" id="{A1DFCBE5-52C1-48A9-89CF-E7D68CCA1620}"/>
+              </a:ext>
+              <a:ext uri="{C183D7F6-B498-43B3-948B-1728B52AA6E4}">
+                <adec:decorative xmlns:adec="http://schemas.microsoft.com/office/drawing/2017/decorative" val="1"/>
+              </a:ext>
+            </a:extLst>
+          </p:cNvPr>
+          <p:cNvSpPr>
+            <a:spLocks noGrp="1" noRot="1" noChangeAspect="1" noMove="1" noResize="1" noEditPoints="1" noAdjustHandles="1" noChangeArrowheads="1" noChangeShapeType="1" noTextEdit="1"/>
+          </p:cNvSpPr>
+          <p:nvPr>
+            <p:extLst>
+              <p:ext uri="{386F3935-93C4-4BCD-93E2-E3B085C9AB24}">
+                <p16:designElem xmlns:p16="http://schemas.microsoft.com/office/powerpoint/2015/main" val="1"/>
+              </p:ext>
+            </p:extLst>
+          </p:nvPr>
+        </p:nvSpPr>
+        <p:spPr>
+          <a:xfrm>
+            <a:off x="0" y="0"/>
+            <a:ext cx="12188952" cy="6858000"/>
+          </a:xfrm>
+          <a:prstGeom prst="rect">
+            <a:avLst/>
+          </a:prstGeom>
+          <a:ln>
+            <a:noFill/>
+          </a:ln>
+        </p:spPr>
+        <p:style>
+          <a:lnRef idx="2">
+            <a:schemeClr val="accent1">
+              <a:shade val="50000"/>
+            </a:schemeClr>
+          </a:lnRef>
+          <a:fillRef idx="1">
+            <a:schemeClr val="accent1"/>
+          </a:fillRef>
+          <a:effectRef idx="0">
+            <a:schemeClr val="accent1"/>
+          </a:effectRef>
+          <a:fontRef idx="minor">
+            <a:schemeClr val="lt1"/>
+          </a:fontRef>
+        </p:style>
+        <p:txBody>
+          <a:bodyPr rtlCol="0" anchor="ctr"/>
+          <a:lstStyle/>
+          <a:p>
+            <a:pPr algn="ctr"/>
+            <a:endParaRPr lang="en-US"/>
+          </a:p>
+        </p:txBody>
+      </p:sp>
+      <p:sp>
+        <p:nvSpPr>
+          <p:cNvPr id="15" name="Freeform: Shape 11">
+            <a:extLst>
+              <a:ext uri="{FF2B5EF4-FFF2-40B4-BE49-F238E27FC236}">
+                <a16:creationId xmlns:a16="http://schemas.microsoft.com/office/drawing/2014/main" id="{06AB74CA-E76D-4922-91FE-A4AAF0487CE8}"/>
+              </a:ext>
+              <a:ext uri="{C183D7F6-B498-43B3-948B-1728B52AA6E4}">
+                <adec:decorative xmlns:adec="http://schemas.microsoft.com/office/drawing/2017/decorative" val="1"/>
+              </a:ext>
+            </a:extLst>
+          </p:cNvPr>
+          <p:cNvSpPr>
+            <a:spLocks noGrp="1" noRot="1" noChangeAspect="1" noMove="1" noResize="1" noEditPoints="1" noAdjustHandles="1" noChangeArrowheads="1" noChangeShapeType="1" noTextEdit="1"/>
+          </p:cNvSpPr>
+          <p:nvPr>
+            <p:extLst>
+              <p:ext uri="{386F3935-93C4-4BCD-93E2-E3B085C9AB24}">
+                <p16:designElem xmlns:p16="http://schemas.microsoft.com/office/powerpoint/2015/main" val="1"/>
+              </p:ext>
+            </p:extLst>
+          </p:nvPr>
+        </p:nvSpPr>
+        <p:spPr>
+          <a:xfrm>
+            <a:off x="0" y="3647203"/>
+            <a:ext cx="11707367" cy="2572622"/>
+          </a:xfrm>
+          <a:custGeom>
+            <a:avLst/>
+            <a:gdLst>
+              <a:gd name="connsiteX0" fmla="*/ 0 w 11707367"/>
+              <a:gd name="connsiteY0" fmla="*/ 0 h 2572622"/>
+              <a:gd name="connsiteX1" fmla="*/ 1888420 w 11707367"/>
+              <a:gd name="connsiteY1" fmla="*/ 0 h 2572622"/>
+              <a:gd name="connsiteX2" fmla="*/ 2198560 w 11707367"/>
+              <a:gd name="connsiteY2" fmla="*/ 310139 h 2572622"/>
+              <a:gd name="connsiteX3" fmla="*/ 2425431 w 11707367"/>
+              <a:gd name="connsiteY3" fmla="*/ 310139 h 2572622"/>
+              <a:gd name="connsiteX4" fmla="*/ 2735570 w 11707367"/>
+              <a:gd name="connsiteY4" fmla="*/ 0 h 2572622"/>
+              <a:gd name="connsiteX5" fmla="*/ 11707367 w 11707367"/>
+              <a:gd name="connsiteY5" fmla="*/ 0 h 2572622"/>
+              <a:gd name="connsiteX6" fmla="*/ 11707367 w 11707367"/>
+              <a:gd name="connsiteY6" fmla="*/ 2572622 h 2572622"/>
+              <a:gd name="connsiteX7" fmla="*/ 0 w 11707367"/>
+              <a:gd name="connsiteY7" fmla="*/ 2572622 h 2572622"/>
+            </a:gdLst>
+            <a:ahLst/>
+            <a:cxnLst>
+              <a:cxn ang="0">
+                <a:pos x="connsiteX0" y="connsiteY0"/>
+              </a:cxn>
+              <a:cxn ang="0">
+                <a:pos x="connsiteX1" y="connsiteY1"/>
+              </a:cxn>
+              <a:cxn ang="0">
+                <a:pos x="connsiteX2" y="connsiteY2"/>
+              </a:cxn>
+              <a:cxn ang="0">
+                <a:pos x="connsiteX3" y="connsiteY3"/>
+              </a:cxn>
+              <a:cxn ang="0">
+                <a:pos x="connsiteX4" y="connsiteY4"/>
+              </a:cxn>
+              <a:cxn ang="0">
+                <a:pos x="connsiteX5" y="connsiteY5"/>
+              </a:cxn>
+              <a:cxn ang="0">
+                <a:pos x="connsiteX6" y="connsiteY6"/>
+              </a:cxn>
+              <a:cxn ang="0">
+                <a:pos x="connsiteX7" y="connsiteY7"/>
+              </a:cxn>
+            </a:cxnLst>
+            <a:rect l="l" t="t" r="r" b="b"/>
+            <a:pathLst>
+              <a:path w="11707367" h="2572622">
+                <a:moveTo>
+                  <a:pt x="0" y="0"/>
+                </a:moveTo>
+                <a:lnTo>
+                  <a:pt x="1888420" y="0"/>
+                </a:lnTo>
+                <a:lnTo>
+                  <a:pt x="2198560" y="310139"/>
+                </a:lnTo>
+                <a:cubicBezTo>
+                  <a:pt x="2261209" y="372788"/>
+                  <a:pt x="2362782" y="372788"/>
+                  <a:pt x="2425431" y="310139"/>
+                </a:cubicBezTo>
+                <a:lnTo>
+                  <a:pt x="2735570" y="0"/>
+                </a:lnTo>
+                <a:lnTo>
+                  <a:pt x="11707367" y="0"/>
+                </a:lnTo>
+                <a:lnTo>
+                  <a:pt x="11707367" y="2572622"/>
+                </a:lnTo>
+                <a:lnTo>
+                  <a:pt x="0" y="2572622"/>
+                </a:lnTo>
+                <a:close/>
+              </a:path>
+            </a:pathLst>
+          </a:custGeom>
+          <a:solidFill>
+            <a:srgbClr val="595959">
+              <a:alpha val="89804"/>
+            </a:srgbClr>
+          </a:solidFill>
+          <a:ln>
+            <a:noFill/>
+          </a:ln>
+        </p:spPr>
+        <p:style>
+          <a:lnRef idx="2">
+            <a:schemeClr val="accent1">
+              <a:shade val="50000"/>
+            </a:schemeClr>
+          </a:lnRef>
+          <a:fillRef idx="1">
+            <a:schemeClr val="accent1"/>
+          </a:fillRef>
+          <a:effectRef idx="0">
+            <a:schemeClr val="accent1"/>
+          </a:effectRef>
+          <a:fontRef idx="minor">
+            <a:schemeClr val="lt1"/>
+          </a:fontRef>
+        </p:style>
+      </p:sp>
       <p:sp>
         <p:nvSpPr>
           <p:cNvPr id="2" name="Title 1">
             <a:extLst>
               <a:ext uri="{FF2B5EF4-FFF2-40B4-BE49-F238E27FC236}">
-                <a16:creationId xmlns:a16="http://schemas.microsoft.com/office/drawing/2014/main" id="{B62602A4-EFD4-4C83-AB2A-8CF4F6885B1A}"/>
-              </a:ext>
-            </a:extLst>
-          </p:cNvPr>
-          <p:cNvSpPr>
-            <a:spLocks noGrp="1"/>
-          </p:cNvSpPr>
-          <p:nvPr>
-            <p:ph type="ctrTitle"/>
-          </p:nvPr>
-        </p:nvSpPr>
-        <p:spPr/>
-        <p:txBody>
-          <a:bodyPr/>
-          <a:lstStyle/>
-          <a:p>
-            <a:r>
-              <a:rPr lang="en-US" dirty="0"/>
-              <a:t>Data Exploration Challenge		</a:t>
-            </a:r>
-          </a:p>
-        </p:txBody>
-      </p:sp>
-      <p:sp>
-        <p:nvSpPr>
-          <p:cNvPr id="3" name="Subtitle 2">
-            <a:extLst>
-              <a:ext uri="{FF2B5EF4-FFF2-40B4-BE49-F238E27FC236}">
-                <a16:creationId xmlns:a16="http://schemas.microsoft.com/office/drawing/2014/main" id="{1655787F-DC30-4572-B12F-FB2BF5ACA492}"/>
-              </a:ext>
-            </a:extLst>
-          </p:cNvPr>
-          <p:cNvSpPr>
-            <a:spLocks noGrp="1"/>
-          </p:cNvSpPr>
-          <p:nvPr>
-            <p:ph type="subTitle" idx="1"/>
-          </p:nvPr>
-        </p:nvSpPr>
-        <p:spPr>
-          <a:xfrm>
-            <a:off x="810001" y="5280847"/>
-            <a:ext cx="10572000" cy="1212718"/>
-          </a:xfrm>
-        </p:spPr>
-        <p:txBody>
-          <a:bodyPr/>
-          <a:lstStyle/>
-          <a:p>
-            <a:r>
-              <a:rPr lang="en-US" dirty="0"/>
-              <a:t>Group Members:</a:t>
-            </a:r>
-          </a:p>
-          <a:p>
-            <a:r>
-              <a:rPr lang="en-US" dirty="0"/>
-              <a:t>Hassan Shahzad</a:t>
-            </a:r>
-          </a:p>
-          <a:p>
-            <a:r>
-              <a:rPr lang="en-US" dirty="0"/>
-              <a:t>Sarah Tayyab</a:t>
-            </a:r>
-          </a:p>
-        </p:txBody>
-      </p:sp>
-    </p:spTree>
-    <p:extLst>
-      <p:ext uri="{BB962C8B-B14F-4D97-AF65-F5344CB8AC3E}">
-        <p14:creationId xmlns:p14="http://schemas.microsoft.com/office/powerpoint/2010/main" val="2269571763"/>
-      </p:ext>
-    </p:extLst>
-  </p:cSld>
-  <p:clrMapOvr>
-    <a:masterClrMapping/>
-  </p:clrMapOvr>
-</p:sld>
-</file>
-
-<file path=ppt/slides/slide10.xml><?xml version="1.0" encoding="utf-8"?>
-<p:sld xmlns:a="http://schemas.openxmlformats.org/drawingml/2006/main" xmlns:r="http://schemas.openxmlformats.org/officeDocument/2006/relationships" xmlns:p="http://schemas.openxmlformats.org/presentationml/2006/main">
-  <p:cSld>
-    <p:spTree>
-      <p:nvGrpSpPr>
-        <p:cNvPr id="1" name=""/>
-        <p:cNvGrpSpPr/>
-        <p:nvPr/>
-      </p:nvGrpSpPr>
-      <p:grpSpPr>
-        <a:xfrm>
-          <a:off x="0" y="0"/>
-          <a:ext cx="0" cy="0"/>
-          <a:chOff x="0" y="0"/>
-          <a:chExt cx="0" cy="0"/>
-        </a:xfrm>
-      </p:grpSpPr>
-      <p:sp>
-        <p:nvSpPr>
-          <p:cNvPr id="2" name="Title 1">
-            <a:extLst>
-              <a:ext uri="{FF2B5EF4-FFF2-40B4-BE49-F238E27FC236}">
-                <a16:creationId xmlns:a16="http://schemas.microsoft.com/office/drawing/2014/main" id="{4422482C-F57A-41C6-957C-79088E5C4D02}"/>
+                <a16:creationId xmlns:a16="http://schemas.microsoft.com/office/drawing/2014/main" id="{C200E9D6-3749-4123-A653-24F1615C7DE2}"/>
               </a:ext>
             </a:extLst>
           </p:cNvPr>
@@ -5477,33 +5575,42 @@
             <p:ph type="title"/>
           </p:nvPr>
         </p:nvSpPr>
-        <p:spPr/>
+        <p:spPr>
+          <a:xfrm>
+            <a:off x="1063691" y="4049486"/>
+            <a:ext cx="4825480" cy="1883228"/>
+          </a:xfrm>
+        </p:spPr>
         <p:txBody>
-          <a:bodyPr/>
+          <a:bodyPr anchor="ctr">
+            <a:normAutofit/>
+          </a:bodyPr>
           <a:lstStyle/>
           <a:p>
             <a:r>
-              <a:rPr lang="en-US" dirty="0"/>
-              <a:t>Continued…</a:t>
+              <a:rPr lang="en-US">
+                <a:solidFill>
+                  <a:srgbClr val="FFFFFF"/>
+                </a:solidFill>
+              </a:rPr>
+              <a:t>Data Cleansing</a:t>
             </a:r>
           </a:p>
         </p:txBody>
       </p:sp>
       <p:pic>
         <p:nvPicPr>
-          <p:cNvPr id="4" name="Content Placeholder 3">
+          <p:cNvPr id="5" name="Picture 4" descr="A picture containing drawing&#10;&#10;Description automatically generated">
             <a:extLst>
               <a:ext uri="{FF2B5EF4-FFF2-40B4-BE49-F238E27FC236}">
-                <a16:creationId xmlns:a16="http://schemas.microsoft.com/office/drawing/2014/main" id="{0A81E643-D4F0-4DAC-B7BE-93FF29B9A4A6}"/>
+                <a16:creationId xmlns:a16="http://schemas.microsoft.com/office/drawing/2014/main" id="{85107AFC-84A8-448C-BEFE-C7675C08B230}"/>
               </a:ext>
             </a:extLst>
           </p:cNvPr>
           <p:cNvPicPr>
-            <a:picLocks noGrp="1" noChangeAspect="1"/>
+            <a:picLocks noChangeAspect="1"/>
           </p:cNvPicPr>
-          <p:nvPr>
-            <p:ph idx="1"/>
-          </p:nvPr>
+          <p:nvPr/>
         </p:nvPicPr>
         <p:blipFill>
           <a:blip r:embed="rId2"/>
@@ -5513,8 +5620,8 @@
         </p:blipFill>
         <p:spPr>
           <a:xfrm>
-            <a:off x="476023" y="2522651"/>
-            <a:ext cx="5051346" cy="3297578"/>
+            <a:off x="1509086" y="484633"/>
+            <a:ext cx="4306107" cy="2875460"/>
           </a:xfrm>
           <a:prstGeom prst="rect">
             <a:avLst/>
@@ -5523,10 +5630,10 @@
       </p:pic>
       <p:pic>
         <p:nvPicPr>
-          <p:cNvPr id="6" name="Picture 5">
+          <p:cNvPr id="4" name="Picture 3" descr="A picture containing meter&#10;&#10;Description automatically generated">
             <a:extLst>
               <a:ext uri="{FF2B5EF4-FFF2-40B4-BE49-F238E27FC236}">
-                <a16:creationId xmlns:a16="http://schemas.microsoft.com/office/drawing/2014/main" id="{84EF9375-CCF1-4316-A60C-23508D94F785}"/>
+                <a16:creationId xmlns:a16="http://schemas.microsoft.com/office/drawing/2014/main" id="{3CF2B511-AB29-4E8F-9359-46C9BC84F132}"/>
               </a:ext>
             </a:extLst>
           </p:cNvPr>
@@ -5543,18 +5650,77 @@
         </p:blipFill>
         <p:spPr>
           <a:xfrm>
-            <a:off x="6197599" y="2522651"/>
-            <a:ext cx="4717143" cy="3297578"/>
+            <a:off x="7336656" y="484633"/>
+            <a:ext cx="3616376" cy="2875460"/>
           </a:xfrm>
           <a:prstGeom prst="rect">
             <a:avLst/>
           </a:prstGeom>
         </p:spPr>
       </p:pic>
+      <p:sp>
+        <p:nvSpPr>
+          <p:cNvPr id="3" name="Content Placeholder 2">
+            <a:extLst>
+              <a:ext uri="{FF2B5EF4-FFF2-40B4-BE49-F238E27FC236}">
+                <a16:creationId xmlns:a16="http://schemas.microsoft.com/office/drawing/2014/main" id="{AA18AC73-E8EF-4E93-B54C-F468D4FF4973}"/>
+              </a:ext>
+            </a:extLst>
+          </p:cNvPr>
+          <p:cNvSpPr>
+            <a:spLocks noGrp="1"/>
+          </p:cNvSpPr>
+          <p:nvPr>
+            <p:ph idx="1"/>
+          </p:nvPr>
+        </p:nvSpPr>
+        <p:spPr>
+          <a:xfrm>
+            <a:off x="6338316" y="4049485"/>
+            <a:ext cx="4846151" cy="1883229"/>
+          </a:xfrm>
+        </p:spPr>
+        <p:txBody>
+          <a:bodyPr>
+            <a:normAutofit/>
+          </a:bodyPr>
+          <a:lstStyle/>
+          <a:p>
+            <a:pPr>
+              <a:lnSpc>
+                <a:spcPct val="90000"/>
+              </a:lnSpc>
+            </a:pPr>
+            <a:r>
+              <a:rPr lang="en-US" sz="1500">
+                <a:solidFill>
+                  <a:srgbClr val="FFFFFF"/>
+                </a:solidFill>
+              </a:rPr>
+              <a:t>The dates recorded were not in the same format in order to deal with the data it had to converted to the same format.</a:t>
+            </a:r>
+          </a:p>
+          <a:p>
+            <a:pPr>
+              <a:lnSpc>
+                <a:spcPct val="90000"/>
+              </a:lnSpc>
+            </a:pPr>
+            <a:r>
+              <a:rPr lang="en-US" sz="1500">
+                <a:solidFill>
+                  <a:srgbClr val="FFFFFF"/>
+                </a:solidFill>
+              </a:rPr>
+              <a:t>The number of data gathered per region was not the same since KPTD has data gathered from 11 March till 22 March irrespective of other regions.</a:t>
+            </a:r>
+          </a:p>
+        </p:txBody>
+      </p:sp>
     </p:spTree>
     <p:extLst>
       <p:ext uri="{BB962C8B-B14F-4D97-AF65-F5344CB8AC3E}">
-        <p14:creationId xmlns:p14="http://schemas.microsoft.com/office/powerpoint/2010/main" val="1387993396"/>
+        <p14:creationId xmlns:p14="http://schemas.microsoft.com/office/powerpoint/2010/main" val="4215640300"/>
       </p:ext>
     </p:extLst>
   </p:cSld>
@@ -5564,7 +5730,7 @@
 </p:sld>
 </file>
 
-<file path=ppt/slides/slide11.xml><?xml version="1.0" encoding="utf-8"?>
+<file path=ppt/slides/slide10.xml><?xml version="1.0" encoding="utf-8"?>
 <p:sld xmlns:a="http://schemas.openxmlformats.org/drawingml/2006/main" xmlns:r="http://schemas.openxmlformats.org/officeDocument/2006/relationships" xmlns:p="http://schemas.openxmlformats.org/presentationml/2006/main">
   <p:cSld>
     <p:spTree>
@@ -6003,7 +6169,7 @@
 </p:sld>
 </file>
 
-<file path=ppt/slides/slide12.xml><?xml version="1.0" encoding="utf-8"?>
+<file path=ppt/slides/slide11.xml><?xml version="1.0" encoding="utf-8"?>
 <p:sld xmlns:a="http://schemas.openxmlformats.org/drawingml/2006/main" xmlns:r="http://schemas.openxmlformats.org/officeDocument/2006/relationships" xmlns:p="http://schemas.openxmlformats.org/presentationml/2006/main">
   <p:cSld>
     <p:spTree>
@@ -8005,7 +8171,7 @@
 </p:sld>
 </file>
 
-<file path=ppt/slides/slide13.xml><?xml version="1.0" encoding="utf-8"?>
+<file path=ppt/slides/slide12.xml><?xml version="1.0" encoding="utf-8"?>
 <p:sld xmlns:a="http://schemas.openxmlformats.org/drawingml/2006/main" xmlns:r="http://schemas.openxmlformats.org/officeDocument/2006/relationships" xmlns:p="http://schemas.openxmlformats.org/presentationml/2006/main">
   <p:cSld>
     <p:bg>
@@ -8380,7 +8546,7 @@
 </p:sld>
 </file>
 
-<file path=ppt/slides/slide14.xml><?xml version="1.0" encoding="utf-8"?>
+<file path=ppt/slides/slide13.xml><?xml version="1.0" encoding="utf-8"?>
 <p:sld xmlns:a="http://schemas.openxmlformats.org/drawingml/2006/main" xmlns:r="http://schemas.openxmlformats.org/officeDocument/2006/relationships" xmlns:p="http://schemas.openxmlformats.org/presentationml/2006/main">
   <p:cSld>
     <p:spTree>
@@ -8475,396 +8641,6 @@
 <file path=ppt/slides/slide2.xml><?xml version="1.0" encoding="utf-8"?>
 <p:sld xmlns:a="http://schemas.openxmlformats.org/drawingml/2006/main" xmlns:r="http://schemas.openxmlformats.org/officeDocument/2006/relationships" xmlns:p="http://schemas.openxmlformats.org/presentationml/2006/main">
   <p:cSld>
-    <p:bg>
-      <p:bgPr>
-        <a:solidFill>
-          <a:schemeClr val="bg2"/>
-        </a:solidFill>
-        <a:effectLst/>
-      </p:bgPr>
-    </p:bg>
-    <p:spTree>
-      <p:nvGrpSpPr>
-        <p:cNvPr id="1" name=""/>
-        <p:cNvGrpSpPr/>
-        <p:nvPr/>
-      </p:nvGrpSpPr>
-      <p:grpSpPr>
-        <a:xfrm>
-          <a:off x="0" y="0"/>
-          <a:ext cx="0" cy="0"/>
-          <a:chOff x="0" y="0"/>
-          <a:chExt cx="0" cy="0"/>
-        </a:xfrm>
-      </p:grpSpPr>
-      <p:sp useBgFill="1">
-        <p:nvSpPr>
-          <p:cNvPr id="14" name="Rectangle 9">
-            <a:extLst>
-              <a:ext uri="{FF2B5EF4-FFF2-40B4-BE49-F238E27FC236}">
-                <a16:creationId xmlns:a16="http://schemas.microsoft.com/office/drawing/2014/main" id="{A1DFCBE5-52C1-48A9-89CF-E7D68CCA1620}"/>
-              </a:ext>
-              <a:ext uri="{C183D7F6-B498-43B3-948B-1728B52AA6E4}">
-                <adec:decorative xmlns:adec="http://schemas.microsoft.com/office/drawing/2017/decorative" val="1"/>
-              </a:ext>
-            </a:extLst>
-          </p:cNvPr>
-          <p:cNvSpPr>
-            <a:spLocks noGrp="1" noRot="1" noChangeAspect="1" noMove="1" noResize="1" noEditPoints="1" noAdjustHandles="1" noChangeArrowheads="1" noChangeShapeType="1" noTextEdit="1"/>
-          </p:cNvSpPr>
-          <p:nvPr>
-            <p:extLst>
-              <p:ext uri="{386F3935-93C4-4BCD-93E2-E3B085C9AB24}">
-                <p16:designElem xmlns:p16="http://schemas.microsoft.com/office/powerpoint/2015/main" val="1"/>
-              </p:ext>
-            </p:extLst>
-          </p:nvPr>
-        </p:nvSpPr>
-        <p:spPr>
-          <a:xfrm>
-            <a:off x="0" y="0"/>
-            <a:ext cx="12188952" cy="6858000"/>
-          </a:xfrm>
-          <a:prstGeom prst="rect">
-            <a:avLst/>
-          </a:prstGeom>
-          <a:ln>
-            <a:noFill/>
-          </a:ln>
-        </p:spPr>
-        <p:style>
-          <a:lnRef idx="2">
-            <a:schemeClr val="accent1">
-              <a:shade val="50000"/>
-            </a:schemeClr>
-          </a:lnRef>
-          <a:fillRef idx="1">
-            <a:schemeClr val="accent1"/>
-          </a:fillRef>
-          <a:effectRef idx="0">
-            <a:schemeClr val="accent1"/>
-          </a:effectRef>
-          <a:fontRef idx="minor">
-            <a:schemeClr val="lt1"/>
-          </a:fontRef>
-        </p:style>
-        <p:txBody>
-          <a:bodyPr rtlCol="0" anchor="ctr"/>
-          <a:lstStyle/>
-          <a:p>
-            <a:pPr algn="ctr"/>
-            <a:endParaRPr lang="en-US"/>
-          </a:p>
-        </p:txBody>
-      </p:sp>
-      <p:sp>
-        <p:nvSpPr>
-          <p:cNvPr id="15" name="Freeform: Shape 11">
-            <a:extLst>
-              <a:ext uri="{FF2B5EF4-FFF2-40B4-BE49-F238E27FC236}">
-                <a16:creationId xmlns:a16="http://schemas.microsoft.com/office/drawing/2014/main" id="{06AB74CA-E76D-4922-91FE-A4AAF0487CE8}"/>
-              </a:ext>
-              <a:ext uri="{C183D7F6-B498-43B3-948B-1728B52AA6E4}">
-                <adec:decorative xmlns:adec="http://schemas.microsoft.com/office/drawing/2017/decorative" val="1"/>
-              </a:ext>
-            </a:extLst>
-          </p:cNvPr>
-          <p:cNvSpPr>
-            <a:spLocks noGrp="1" noRot="1" noChangeAspect="1" noMove="1" noResize="1" noEditPoints="1" noAdjustHandles="1" noChangeArrowheads="1" noChangeShapeType="1" noTextEdit="1"/>
-          </p:cNvSpPr>
-          <p:nvPr>
-            <p:extLst>
-              <p:ext uri="{386F3935-93C4-4BCD-93E2-E3B085C9AB24}">
-                <p16:designElem xmlns:p16="http://schemas.microsoft.com/office/powerpoint/2015/main" val="1"/>
-              </p:ext>
-            </p:extLst>
-          </p:nvPr>
-        </p:nvSpPr>
-        <p:spPr>
-          <a:xfrm>
-            <a:off x="0" y="3647203"/>
-            <a:ext cx="11707367" cy="2572622"/>
-          </a:xfrm>
-          <a:custGeom>
-            <a:avLst/>
-            <a:gdLst>
-              <a:gd name="connsiteX0" fmla="*/ 0 w 11707367"/>
-              <a:gd name="connsiteY0" fmla="*/ 0 h 2572622"/>
-              <a:gd name="connsiteX1" fmla="*/ 1888420 w 11707367"/>
-              <a:gd name="connsiteY1" fmla="*/ 0 h 2572622"/>
-              <a:gd name="connsiteX2" fmla="*/ 2198560 w 11707367"/>
-              <a:gd name="connsiteY2" fmla="*/ 310139 h 2572622"/>
-              <a:gd name="connsiteX3" fmla="*/ 2425431 w 11707367"/>
-              <a:gd name="connsiteY3" fmla="*/ 310139 h 2572622"/>
-              <a:gd name="connsiteX4" fmla="*/ 2735570 w 11707367"/>
-              <a:gd name="connsiteY4" fmla="*/ 0 h 2572622"/>
-              <a:gd name="connsiteX5" fmla="*/ 11707367 w 11707367"/>
-              <a:gd name="connsiteY5" fmla="*/ 0 h 2572622"/>
-              <a:gd name="connsiteX6" fmla="*/ 11707367 w 11707367"/>
-              <a:gd name="connsiteY6" fmla="*/ 2572622 h 2572622"/>
-              <a:gd name="connsiteX7" fmla="*/ 0 w 11707367"/>
-              <a:gd name="connsiteY7" fmla="*/ 2572622 h 2572622"/>
-            </a:gdLst>
-            <a:ahLst/>
-            <a:cxnLst>
-              <a:cxn ang="0">
-                <a:pos x="connsiteX0" y="connsiteY0"/>
-              </a:cxn>
-              <a:cxn ang="0">
-                <a:pos x="connsiteX1" y="connsiteY1"/>
-              </a:cxn>
-              <a:cxn ang="0">
-                <a:pos x="connsiteX2" y="connsiteY2"/>
-              </a:cxn>
-              <a:cxn ang="0">
-                <a:pos x="connsiteX3" y="connsiteY3"/>
-              </a:cxn>
-              <a:cxn ang="0">
-                <a:pos x="connsiteX4" y="connsiteY4"/>
-              </a:cxn>
-              <a:cxn ang="0">
-                <a:pos x="connsiteX5" y="connsiteY5"/>
-              </a:cxn>
-              <a:cxn ang="0">
-                <a:pos x="connsiteX6" y="connsiteY6"/>
-              </a:cxn>
-              <a:cxn ang="0">
-                <a:pos x="connsiteX7" y="connsiteY7"/>
-              </a:cxn>
-            </a:cxnLst>
-            <a:rect l="l" t="t" r="r" b="b"/>
-            <a:pathLst>
-              <a:path w="11707367" h="2572622">
-                <a:moveTo>
-                  <a:pt x="0" y="0"/>
-                </a:moveTo>
-                <a:lnTo>
-                  <a:pt x="1888420" y="0"/>
-                </a:lnTo>
-                <a:lnTo>
-                  <a:pt x="2198560" y="310139"/>
-                </a:lnTo>
-                <a:cubicBezTo>
-                  <a:pt x="2261209" y="372788"/>
-                  <a:pt x="2362782" y="372788"/>
-                  <a:pt x="2425431" y="310139"/>
-                </a:cubicBezTo>
-                <a:lnTo>
-                  <a:pt x="2735570" y="0"/>
-                </a:lnTo>
-                <a:lnTo>
-                  <a:pt x="11707367" y="0"/>
-                </a:lnTo>
-                <a:lnTo>
-                  <a:pt x="11707367" y="2572622"/>
-                </a:lnTo>
-                <a:lnTo>
-                  <a:pt x="0" y="2572622"/>
-                </a:lnTo>
-                <a:close/>
-              </a:path>
-            </a:pathLst>
-          </a:custGeom>
-          <a:solidFill>
-            <a:srgbClr val="595959">
-              <a:alpha val="89804"/>
-            </a:srgbClr>
-          </a:solidFill>
-          <a:ln>
-            <a:noFill/>
-          </a:ln>
-        </p:spPr>
-        <p:style>
-          <a:lnRef idx="2">
-            <a:schemeClr val="accent1">
-              <a:shade val="50000"/>
-            </a:schemeClr>
-          </a:lnRef>
-          <a:fillRef idx="1">
-            <a:schemeClr val="accent1"/>
-          </a:fillRef>
-          <a:effectRef idx="0">
-            <a:schemeClr val="accent1"/>
-          </a:effectRef>
-          <a:fontRef idx="minor">
-            <a:schemeClr val="lt1"/>
-          </a:fontRef>
-        </p:style>
-      </p:sp>
-      <p:sp>
-        <p:nvSpPr>
-          <p:cNvPr id="2" name="Title 1">
-            <a:extLst>
-              <a:ext uri="{FF2B5EF4-FFF2-40B4-BE49-F238E27FC236}">
-                <a16:creationId xmlns:a16="http://schemas.microsoft.com/office/drawing/2014/main" id="{C200E9D6-3749-4123-A653-24F1615C7DE2}"/>
-              </a:ext>
-            </a:extLst>
-          </p:cNvPr>
-          <p:cNvSpPr>
-            <a:spLocks noGrp="1"/>
-          </p:cNvSpPr>
-          <p:nvPr>
-            <p:ph type="title"/>
-          </p:nvPr>
-        </p:nvSpPr>
-        <p:spPr>
-          <a:xfrm>
-            <a:off x="1063691" y="4049486"/>
-            <a:ext cx="4825480" cy="1883228"/>
-          </a:xfrm>
-        </p:spPr>
-        <p:txBody>
-          <a:bodyPr anchor="ctr">
-            <a:normAutofit/>
-          </a:bodyPr>
-          <a:lstStyle/>
-          <a:p>
-            <a:r>
-              <a:rPr lang="en-US">
-                <a:solidFill>
-                  <a:srgbClr val="FFFFFF"/>
-                </a:solidFill>
-              </a:rPr>
-              <a:t>Data Cleansing</a:t>
-            </a:r>
-          </a:p>
-        </p:txBody>
-      </p:sp>
-      <p:pic>
-        <p:nvPicPr>
-          <p:cNvPr id="5" name="Picture 4" descr="A picture containing drawing&#10;&#10;Description automatically generated">
-            <a:extLst>
-              <a:ext uri="{FF2B5EF4-FFF2-40B4-BE49-F238E27FC236}">
-                <a16:creationId xmlns:a16="http://schemas.microsoft.com/office/drawing/2014/main" id="{85107AFC-84A8-448C-BEFE-C7675C08B230}"/>
-              </a:ext>
-            </a:extLst>
-          </p:cNvPr>
-          <p:cNvPicPr>
-            <a:picLocks noChangeAspect="1"/>
-          </p:cNvPicPr>
-          <p:nvPr/>
-        </p:nvPicPr>
-        <p:blipFill>
-          <a:blip r:embed="rId2"/>
-          <a:stretch>
-            <a:fillRect/>
-          </a:stretch>
-        </p:blipFill>
-        <p:spPr>
-          <a:xfrm>
-            <a:off x="1509086" y="484633"/>
-            <a:ext cx="4306107" cy="2875460"/>
-          </a:xfrm>
-          <a:prstGeom prst="rect">
-            <a:avLst/>
-          </a:prstGeom>
-        </p:spPr>
-      </p:pic>
-      <p:pic>
-        <p:nvPicPr>
-          <p:cNvPr id="4" name="Picture 3" descr="A picture containing meter&#10;&#10;Description automatically generated">
-            <a:extLst>
-              <a:ext uri="{FF2B5EF4-FFF2-40B4-BE49-F238E27FC236}">
-                <a16:creationId xmlns:a16="http://schemas.microsoft.com/office/drawing/2014/main" id="{3CF2B511-AB29-4E8F-9359-46C9BC84F132}"/>
-              </a:ext>
-            </a:extLst>
-          </p:cNvPr>
-          <p:cNvPicPr>
-            <a:picLocks noChangeAspect="1"/>
-          </p:cNvPicPr>
-          <p:nvPr/>
-        </p:nvPicPr>
-        <p:blipFill>
-          <a:blip r:embed="rId3"/>
-          <a:stretch>
-            <a:fillRect/>
-          </a:stretch>
-        </p:blipFill>
-        <p:spPr>
-          <a:xfrm>
-            <a:off x="7336656" y="484633"/>
-            <a:ext cx="3616376" cy="2875460"/>
-          </a:xfrm>
-          <a:prstGeom prst="rect">
-            <a:avLst/>
-          </a:prstGeom>
-        </p:spPr>
-      </p:pic>
-      <p:sp>
-        <p:nvSpPr>
-          <p:cNvPr id="3" name="Content Placeholder 2">
-            <a:extLst>
-              <a:ext uri="{FF2B5EF4-FFF2-40B4-BE49-F238E27FC236}">
-                <a16:creationId xmlns:a16="http://schemas.microsoft.com/office/drawing/2014/main" id="{AA18AC73-E8EF-4E93-B54C-F468D4FF4973}"/>
-              </a:ext>
-            </a:extLst>
-          </p:cNvPr>
-          <p:cNvSpPr>
-            <a:spLocks noGrp="1"/>
-          </p:cNvSpPr>
-          <p:nvPr>
-            <p:ph idx="1"/>
-          </p:nvPr>
-        </p:nvSpPr>
-        <p:spPr>
-          <a:xfrm>
-            <a:off x="6338316" y="4049485"/>
-            <a:ext cx="4846151" cy="1883229"/>
-          </a:xfrm>
-        </p:spPr>
-        <p:txBody>
-          <a:bodyPr>
-            <a:normAutofit/>
-          </a:bodyPr>
-          <a:lstStyle/>
-          <a:p>
-            <a:pPr>
-              <a:lnSpc>
-                <a:spcPct val="90000"/>
-              </a:lnSpc>
-            </a:pPr>
-            <a:r>
-              <a:rPr lang="en-US" sz="1500">
-                <a:solidFill>
-                  <a:srgbClr val="FFFFFF"/>
-                </a:solidFill>
-              </a:rPr>
-              <a:t>The dates recorded were not in the same format in order to deal with the data it had to converted to the same format.</a:t>
-            </a:r>
-          </a:p>
-          <a:p>
-            <a:pPr>
-              <a:lnSpc>
-                <a:spcPct val="90000"/>
-              </a:lnSpc>
-            </a:pPr>
-            <a:r>
-              <a:rPr lang="en-US" sz="1500">
-                <a:solidFill>
-                  <a:srgbClr val="FFFFFF"/>
-                </a:solidFill>
-              </a:rPr>
-              <a:t>The number of data gathered per region was not the same since KPTD has data gathered from 11 March till 22 March irrespective of other regions.</a:t>
-            </a:r>
-          </a:p>
-        </p:txBody>
-      </p:sp>
-    </p:spTree>
-    <p:extLst>
-      <p:ext uri="{BB962C8B-B14F-4D97-AF65-F5344CB8AC3E}">
-        <p14:creationId xmlns:p14="http://schemas.microsoft.com/office/powerpoint/2010/main" val="4215640300"/>
-      </p:ext>
-    </p:extLst>
-  </p:cSld>
-  <p:clrMapOvr>
-    <a:masterClrMapping/>
-  </p:clrMapOvr>
-</p:sld>
-</file>
-
-<file path=ppt/slides/slide3.xml><?xml version="1.0" encoding="utf-8"?>
-<p:sld xmlns:a="http://schemas.openxmlformats.org/drawingml/2006/main" xmlns:r="http://schemas.openxmlformats.org/officeDocument/2006/relationships" xmlns:p="http://schemas.openxmlformats.org/presentationml/2006/main">
-  <p:cSld>
     <p:spTree>
       <p:nvGrpSpPr>
         <p:cNvPr id="1" name=""/>
@@ -9014,7 +8790,7 @@
 </p:sld>
 </file>
 
-<file path=ppt/slides/slide4.xml><?xml version="1.0" encoding="utf-8"?>
+<file path=ppt/slides/slide3.xml><?xml version="1.0" encoding="utf-8"?>
 <p:sld xmlns:a="http://schemas.openxmlformats.org/drawingml/2006/main" xmlns:r="http://schemas.openxmlformats.org/officeDocument/2006/relationships" xmlns:p="http://schemas.openxmlformats.org/presentationml/2006/main">
   <p:cSld>
     <p:spTree>
@@ -9120,7 +8896,7 @@
 </p:sld>
 </file>
 
-<file path=ppt/slides/slide5.xml><?xml version="1.0" encoding="utf-8"?>
+<file path=ppt/slides/slide4.xml><?xml version="1.0" encoding="utf-8"?>
 <p:sld xmlns:a="http://schemas.openxmlformats.org/drawingml/2006/main" xmlns:r="http://schemas.openxmlformats.org/officeDocument/2006/relationships" xmlns:p="http://schemas.openxmlformats.org/presentationml/2006/main">
   <p:cSld>
     <p:bg>
@@ -9240,7 +9016,7 @@
           <a:effectLst/>
           <a:extLst>
             <a:ext uri="{91240B29-F687-4f45-9708-019B960494DF}">
-              <a14:hiddenLine xmlns:p14="http://schemas.microsoft.com/office/powerpoint/2010/main" xmlns:a14="http://schemas.microsoft.com/office/drawing/2010/main" xmlns:a16="http://schemas.microsoft.com/office/drawing/2014/main" xmlns="" w="9525">
+              <a14:hiddenLine xmlns="" xmlns:a16="http://schemas.microsoft.com/office/drawing/2014/main" xmlns:a14="http://schemas.microsoft.com/office/drawing/2010/main" xmlns:p14="http://schemas.microsoft.com/office/powerpoint/2010/main" w="9525">
                 <a:solidFill>
                   <a:srgbClr val="000000"/>
                 </a:solidFill>
@@ -9801,7 +9577,7 @@
 </p:sld>
 </file>
 
-<file path=ppt/slides/slide6.xml><?xml version="1.0" encoding="utf-8"?>
+<file path=ppt/slides/slide5.xml><?xml version="1.0" encoding="utf-8"?>
 <p:sld xmlns:a="http://schemas.openxmlformats.org/drawingml/2006/main" xmlns:r="http://schemas.openxmlformats.org/officeDocument/2006/relationships" xmlns:p="http://schemas.openxmlformats.org/presentationml/2006/main">
   <p:cSld>
     <p:bg>
@@ -9921,7 +9697,7 @@
           <a:effectLst/>
           <a:extLst>
             <a:ext uri="{91240B29-F687-4f45-9708-019B960494DF}">
-              <a14:hiddenLine xmlns:p14="http://schemas.microsoft.com/office/powerpoint/2010/main" xmlns:a14="http://schemas.microsoft.com/office/drawing/2010/main" xmlns:a16="http://schemas.microsoft.com/office/drawing/2014/main" xmlns="" w="9525">
+              <a14:hiddenLine xmlns="" xmlns:a16="http://schemas.microsoft.com/office/drawing/2014/main" xmlns:a14="http://schemas.microsoft.com/office/drawing/2010/main" xmlns:p14="http://schemas.microsoft.com/office/powerpoint/2010/main" w="9525">
                 <a:solidFill>
                   <a:srgbClr val="000000"/>
                 </a:solidFill>
@@ -10477,7 +10253,7 @@
 </p:sld>
 </file>
 
-<file path=ppt/slides/slide7.xml><?xml version="1.0" encoding="utf-8"?>
+<file path=ppt/slides/slide6.xml><?xml version="1.0" encoding="utf-8"?>
 <p:sld xmlns:a="http://schemas.openxmlformats.org/drawingml/2006/main" xmlns:r="http://schemas.openxmlformats.org/officeDocument/2006/relationships" xmlns:p="http://schemas.openxmlformats.org/presentationml/2006/main">
   <p:cSld>
     <p:bg>
@@ -10597,7 +10373,7 @@
           <a:effectLst/>
           <a:extLst>
             <a:ext uri="{91240B29-F687-4f45-9708-019B960494DF}">
-              <a14:hiddenLine xmlns:p14="http://schemas.microsoft.com/office/powerpoint/2010/main" xmlns:a14="http://schemas.microsoft.com/office/drawing/2010/main" xmlns:a16="http://schemas.microsoft.com/office/drawing/2014/main" xmlns="" w="9525">
+              <a14:hiddenLine xmlns="" xmlns:a16="http://schemas.microsoft.com/office/drawing/2014/main" xmlns:a14="http://schemas.microsoft.com/office/drawing/2010/main" xmlns:p14="http://schemas.microsoft.com/office/powerpoint/2010/main" w="9525">
                 <a:solidFill>
                   <a:srgbClr val="000000"/>
                 </a:solidFill>
@@ -11153,7 +10929,7 @@
 </p:sld>
 </file>
 
-<file path=ppt/slides/slide8.xml><?xml version="1.0" encoding="utf-8"?>
+<file path=ppt/slides/slide7.xml><?xml version="1.0" encoding="utf-8"?>
 <p:sld xmlns:a="http://schemas.openxmlformats.org/drawingml/2006/main" xmlns:r="http://schemas.openxmlformats.org/officeDocument/2006/relationships" xmlns:p="http://schemas.openxmlformats.org/presentationml/2006/main">
   <p:cSld>
     <p:bg>
@@ -11273,7 +11049,7 @@
           <a:effectLst/>
           <a:extLst>
             <a:ext uri="{91240B29-F687-4f45-9708-019B960494DF}">
-              <a14:hiddenLine xmlns:p14="http://schemas.microsoft.com/office/powerpoint/2010/main" xmlns:a14="http://schemas.microsoft.com/office/drawing/2010/main" xmlns:a16="http://schemas.microsoft.com/office/drawing/2014/main" xmlns="" w="9525">
+              <a14:hiddenLine xmlns="" xmlns:a16="http://schemas.microsoft.com/office/drawing/2014/main" xmlns:a14="http://schemas.microsoft.com/office/drawing/2010/main" xmlns:p14="http://schemas.microsoft.com/office/powerpoint/2010/main" w="9525">
                 <a:solidFill>
                   <a:srgbClr val="000000"/>
                 </a:solidFill>
@@ -11829,7 +11605,7 @@
 </p:sld>
 </file>
 
-<file path=ppt/slides/slide9.xml><?xml version="1.0" encoding="utf-8"?>
+<file path=ppt/slides/slide8.xml><?xml version="1.0" encoding="utf-8"?>
 <p:sld xmlns:a="http://schemas.openxmlformats.org/drawingml/2006/main" xmlns:r="http://schemas.openxmlformats.org/officeDocument/2006/relationships" xmlns:p="http://schemas.openxmlformats.org/presentationml/2006/main">
   <p:cSld>
     <p:spTree>
@@ -11940,6 +11716,126 @@
     <p:extLst>
       <p:ext uri="{BB962C8B-B14F-4D97-AF65-F5344CB8AC3E}">
         <p14:creationId xmlns:p14="http://schemas.microsoft.com/office/powerpoint/2010/main" val="495004601"/>
+      </p:ext>
+    </p:extLst>
+  </p:cSld>
+  <p:clrMapOvr>
+    <a:masterClrMapping/>
+  </p:clrMapOvr>
+</p:sld>
+</file>
+
+<file path=ppt/slides/slide9.xml><?xml version="1.0" encoding="utf-8"?>
+<p:sld xmlns:a="http://schemas.openxmlformats.org/drawingml/2006/main" xmlns:r="http://schemas.openxmlformats.org/officeDocument/2006/relationships" xmlns:p="http://schemas.openxmlformats.org/presentationml/2006/main">
+  <p:cSld>
+    <p:spTree>
+      <p:nvGrpSpPr>
+        <p:cNvPr id="1" name=""/>
+        <p:cNvGrpSpPr/>
+        <p:nvPr/>
+      </p:nvGrpSpPr>
+      <p:grpSpPr>
+        <a:xfrm>
+          <a:off x="0" y="0"/>
+          <a:ext cx="0" cy="0"/>
+          <a:chOff x="0" y="0"/>
+          <a:chExt cx="0" cy="0"/>
+        </a:xfrm>
+      </p:grpSpPr>
+      <p:sp>
+        <p:nvSpPr>
+          <p:cNvPr id="2" name="Title 1">
+            <a:extLst>
+              <a:ext uri="{FF2B5EF4-FFF2-40B4-BE49-F238E27FC236}">
+                <a16:creationId xmlns:a16="http://schemas.microsoft.com/office/drawing/2014/main" id="{4422482C-F57A-41C6-957C-79088E5C4D02}"/>
+              </a:ext>
+            </a:extLst>
+          </p:cNvPr>
+          <p:cNvSpPr>
+            <a:spLocks noGrp="1"/>
+          </p:cNvSpPr>
+          <p:nvPr>
+            <p:ph type="title"/>
+          </p:nvPr>
+        </p:nvSpPr>
+        <p:spPr/>
+        <p:txBody>
+          <a:bodyPr/>
+          <a:lstStyle/>
+          <a:p>
+            <a:r>
+              <a:rPr lang="en-US" dirty="0"/>
+              <a:t>Continued…</a:t>
+            </a:r>
+          </a:p>
+        </p:txBody>
+      </p:sp>
+      <p:pic>
+        <p:nvPicPr>
+          <p:cNvPr id="4" name="Content Placeholder 3">
+            <a:extLst>
+              <a:ext uri="{FF2B5EF4-FFF2-40B4-BE49-F238E27FC236}">
+                <a16:creationId xmlns:a16="http://schemas.microsoft.com/office/drawing/2014/main" id="{0A81E643-D4F0-4DAC-B7BE-93FF29B9A4A6}"/>
+              </a:ext>
+            </a:extLst>
+          </p:cNvPr>
+          <p:cNvPicPr>
+            <a:picLocks noGrp="1" noChangeAspect="1"/>
+          </p:cNvPicPr>
+          <p:nvPr>
+            <p:ph idx="1"/>
+          </p:nvPr>
+        </p:nvPicPr>
+        <p:blipFill>
+          <a:blip r:embed="rId2"/>
+          <a:stretch>
+            <a:fillRect/>
+          </a:stretch>
+        </p:blipFill>
+        <p:spPr>
+          <a:xfrm>
+            <a:off x="476023" y="2522651"/>
+            <a:ext cx="5051346" cy="3297578"/>
+          </a:xfrm>
+          <a:prstGeom prst="rect">
+            <a:avLst/>
+          </a:prstGeom>
+        </p:spPr>
+      </p:pic>
+      <p:pic>
+        <p:nvPicPr>
+          <p:cNvPr id="6" name="Picture 5">
+            <a:extLst>
+              <a:ext uri="{FF2B5EF4-FFF2-40B4-BE49-F238E27FC236}">
+                <a16:creationId xmlns:a16="http://schemas.microsoft.com/office/drawing/2014/main" id="{84EF9375-CCF1-4316-A60C-23508D94F785}"/>
+              </a:ext>
+            </a:extLst>
+          </p:cNvPr>
+          <p:cNvPicPr>
+            <a:picLocks noChangeAspect="1"/>
+          </p:cNvPicPr>
+          <p:nvPr/>
+        </p:nvPicPr>
+        <p:blipFill>
+          <a:blip r:embed="rId3"/>
+          <a:stretch>
+            <a:fillRect/>
+          </a:stretch>
+        </p:blipFill>
+        <p:spPr>
+          <a:xfrm>
+            <a:off x="6197599" y="2522651"/>
+            <a:ext cx="4717143" cy="3297578"/>
+          </a:xfrm>
+          <a:prstGeom prst="rect">
+            <a:avLst/>
+          </a:prstGeom>
+        </p:spPr>
+      </p:pic>
+    </p:spTree>
+    <p:extLst>
+      <p:ext uri="{BB962C8B-B14F-4D97-AF65-F5344CB8AC3E}">
+        <p14:creationId xmlns:p14="http://schemas.microsoft.com/office/powerpoint/2010/main" val="1387993396"/>
       </p:ext>
     </p:extLst>
   </p:cSld>

</xml_diff>